<commit_message>
Fixed image file pointers
</commit_message>
<xml_diff>
--- a/talks/software.pptx
+++ b/talks/software.pptx
@@ -5,7 +5,7 @@
     <p:sldMasterId id="2147483648" r:id="rId1"/>
   </p:sldMasterIdLst>
   <p:notesMasterIdLst>
-    <p:NotesMasterId r:id="rId10"/>
+    <p:NotesMasterId r:id="rId15"/>
   </p:notesMasterIdLst>
   <p:sldIdLst>
     <p:sldId id="256" r:id="rId2"/>
@@ -16,6 +16,11 @@
     <p:sldId id="261" r:id="rId7"/>
     <p:sldId id="262" r:id="rId8"/>
     <p:sldId id="263" r:id="rId9"/>
+    <p:sldId id="264" r:id="rId10"/>
+    <p:sldId id="265" r:id="rId11"/>
+    <p:sldId id="266" r:id="rId12"/>
+    <p:sldId id="267" r:id="rId13"/>
+    <p:sldId id="268" r:id="rId14"/>
   </p:sldIdLst>
   <p:sldSz cx="9144000" cy="6858000" type="screen4x3"/>
   <p:notesSz cx="6858000" cy="9144000"/>
@@ -3636,23 +3641,875 @@
             </a:pPr>
             <a:r>
               <a:rPr/>
-              <a:t>In</a:t>
-            </a:r>
-            <a:r>
-              <a:rPr/>
-              <a:t> </a:t>
-            </a:r>
-            <a:r>
-              <a:rPr/>
-              <a:t>summary,</a:t>
-            </a:r>
-            <a:r>
-              <a:rPr/>
-              <a:t> </a:t>
-            </a:r>
-            <a:r>
-              <a:rPr/>
-              <a:t>…</a:t>
+              <a:t>Mapreduce</a:t>
+            </a:r>
+            <a:r>
+              <a:rPr/>
+              <a:t> </a:t>
+            </a:r>
+            <a:r>
+              <a:rPr/>
+              <a:t>is</a:t>
+            </a:r>
+            <a:r>
+              <a:rPr/>
+              <a:t> </a:t>
+            </a:r>
+            <a:r>
+              <a:rPr/>
+              <a:t>system</a:t>
+            </a:r>
+            <a:r>
+              <a:rPr/>
+              <a:t> </a:t>
+            </a:r>
+            <a:r>
+              <a:rPr/>
+              <a:t>for</a:t>
+            </a:r>
+            <a:r>
+              <a:rPr/>
+              <a:t> </a:t>
+            </a:r>
+            <a:r>
+              <a:rPr/>
+              <a:t>sending</a:t>
+            </a:r>
+            <a:r>
+              <a:rPr/>
+              <a:t> </a:t>
+            </a:r>
+            <a:r>
+              <a:rPr/>
+              <a:t>pieces</a:t>
+            </a:r>
+            <a:r>
+              <a:rPr/>
+              <a:t> </a:t>
+            </a:r>
+            <a:r>
+              <a:rPr/>
+              <a:t>of</a:t>
+            </a:r>
+            <a:r>
+              <a:rPr/>
+              <a:t> </a:t>
+            </a:r>
+            <a:r>
+              <a:rPr/>
+              <a:t>a</a:t>
+            </a:r>
+            <a:r>
+              <a:rPr/>
+              <a:t> </a:t>
+            </a:r>
+            <a:r>
+              <a:rPr/>
+              <a:t>programming</a:t>
+            </a:r>
+            <a:r>
+              <a:rPr/>
+              <a:t> </a:t>
+            </a:r>
+            <a:r>
+              <a:rPr/>
+              <a:t>problem</a:t>
+            </a:r>
+            <a:r>
+              <a:rPr/>
+              <a:t> </a:t>
+            </a:r>
+            <a:r>
+              <a:rPr/>
+              <a:t>to</a:t>
+            </a:r>
+            <a:r>
+              <a:rPr/>
+              <a:t> </a:t>
+            </a:r>
+            <a:r>
+              <a:rPr/>
+              <a:t>individual</a:t>
+            </a:r>
+            <a:r>
+              <a:rPr/>
+              <a:t> </a:t>
+            </a:r>
+            <a:r>
+              <a:rPr/>
+              <a:t>nodes</a:t>
+            </a:r>
+            <a:r>
+              <a:rPr/>
+              <a:t> </a:t>
+            </a:r>
+            <a:r>
+              <a:rPr/>
+              <a:t>of</a:t>
+            </a:r>
+            <a:r>
+              <a:rPr/>
+              <a:t> </a:t>
+            </a:r>
+            <a:r>
+              <a:rPr/>
+              <a:t>a</a:t>
+            </a:r>
+            <a:r>
+              <a:rPr/>
+              <a:t> </a:t>
+            </a:r>
+            <a:r>
+              <a:rPr/>
+              <a:t>cluster</a:t>
+            </a:r>
+            <a:r>
+              <a:rPr/>
+              <a:t> </a:t>
+            </a:r>
+            <a:r>
+              <a:rPr/>
+              <a:t>computer</a:t>
+            </a:r>
+            <a:r>
+              <a:rPr/>
+              <a:t> </a:t>
+            </a:r>
+            <a:r>
+              <a:rPr/>
+              <a:t>(the</a:t>
+            </a:r>
+            <a:r>
+              <a:rPr/>
+              <a:t> </a:t>
+            </a:r>
+            <a:r>
+              <a:rPr/>
+              <a:t>map</a:t>
+            </a:r>
+            <a:r>
+              <a:rPr/>
+              <a:t> </a:t>
+            </a:r>
+            <a:r>
+              <a:rPr/>
+              <a:t>part),</a:t>
+            </a:r>
+            <a:r>
+              <a:rPr/>
+              <a:t> </a:t>
+            </a:r>
+            <a:r>
+              <a:rPr/>
+              <a:t>having</a:t>
+            </a:r>
+            <a:r>
+              <a:rPr/>
+              <a:t> </a:t>
+            </a:r>
+            <a:r>
+              <a:rPr/>
+              <a:t>those</a:t>
+            </a:r>
+            <a:r>
+              <a:rPr/>
+              <a:t> </a:t>
+            </a:r>
+            <a:r>
+              <a:rPr/>
+              <a:t>nodes</a:t>
+            </a:r>
+            <a:r>
+              <a:rPr/>
+              <a:t> </a:t>
+            </a:r>
+            <a:r>
+              <a:rPr/>
+              <a:t>produce</a:t>
+            </a:r>
+            <a:r>
+              <a:rPr/>
+              <a:t> </a:t>
+            </a:r>
+            <a:r>
+              <a:rPr/>
+              <a:t>a</a:t>
+            </a:r>
+            <a:r>
+              <a:rPr/>
+              <a:t> </a:t>
+            </a:r>
+            <a:r>
+              <a:rPr/>
+              <a:t>summary</a:t>
+            </a:r>
+            <a:r>
+              <a:rPr/>
+              <a:t> </a:t>
+            </a:r>
+            <a:r>
+              <a:rPr/>
+              <a:t>(the</a:t>
+            </a:r>
+            <a:r>
+              <a:rPr/>
+              <a:t> </a:t>
+            </a:r>
+            <a:r>
+              <a:rPr/>
+              <a:t>reduce</a:t>
+            </a:r>
+            <a:r>
+              <a:rPr/>
+              <a:t> </a:t>
+            </a:r>
+            <a:r>
+              <a:rPr/>
+              <a:t>part),</a:t>
+            </a:r>
+            <a:r>
+              <a:rPr/>
+              <a:t> </a:t>
+            </a:r>
+            <a:r>
+              <a:rPr/>
+              <a:t>and</a:t>
+            </a:r>
+            <a:r>
+              <a:rPr/>
+              <a:t> </a:t>
+            </a:r>
+            <a:r>
+              <a:rPr/>
+              <a:t>then</a:t>
+            </a:r>
+            <a:r>
+              <a:rPr/>
+              <a:t> </a:t>
+            </a:r>
+            <a:r>
+              <a:rPr/>
+              <a:t>recombining</a:t>
+            </a:r>
+            <a:r>
+              <a:rPr/>
+              <a:t> </a:t>
+            </a:r>
+            <a:r>
+              <a:rPr/>
+              <a:t>the</a:t>
+            </a:r>
+            <a:r>
+              <a:rPr/>
+              <a:t> </a:t>
+            </a:r>
+            <a:r>
+              <a:rPr/>
+              <a:t>individual</a:t>
+            </a:r>
+            <a:r>
+              <a:rPr/>
+              <a:t> </a:t>
+            </a:r>
+            <a:r>
+              <a:rPr/>
+              <a:t>node</a:t>
+            </a:r>
+            <a:r>
+              <a:rPr/>
+              <a:t> </a:t>
+            </a:r>
+            <a:r>
+              <a:rPr/>
+              <a:t>summaries.</a:t>
+            </a:r>
+          </a:p>
+          <a:p>
+            <a:pPr lvl="0" marL="0" indent="0">
+              <a:buNone/>
+            </a:pPr>
+          </a:p>
+          <a:p>
+            <a:pPr lvl="0" marL="0" indent="0">
+              <a:buNone/>
+            </a:pPr>
+            <a:r>
+              <a:rPr/>
+              <a:t>Although</a:t>
+            </a:r>
+            <a:r>
+              <a:rPr/>
+              <a:t> </a:t>
+            </a:r>
+            <a:r>
+              <a:rPr/>
+              <a:t>Mapreduce</a:t>
+            </a:r>
+            <a:r>
+              <a:rPr/>
+              <a:t> </a:t>
+            </a:r>
+            <a:r>
+              <a:rPr/>
+              <a:t>is</a:t>
+            </a:r>
+            <a:r>
+              <a:rPr/>
+              <a:t> </a:t>
+            </a:r>
+            <a:r>
+              <a:rPr/>
+              <a:t>at</a:t>
+            </a:r>
+            <a:r>
+              <a:rPr/>
+              <a:t> </a:t>
+            </a:r>
+            <a:r>
+              <a:rPr/>
+              <a:t>the</a:t>
+            </a:r>
+            <a:r>
+              <a:rPr/>
+              <a:t> </a:t>
+            </a:r>
+            <a:r>
+              <a:rPr/>
+              <a:t>heart</a:t>
+            </a:r>
+            <a:r>
+              <a:rPr/>
+              <a:t> </a:t>
+            </a:r>
+            <a:r>
+              <a:rPr/>
+              <a:t>and</a:t>
+            </a:r>
+            <a:r>
+              <a:rPr/>
+              <a:t> </a:t>
+            </a:r>
+            <a:r>
+              <a:rPr/>
+              <a:t>soul</a:t>
+            </a:r>
+            <a:r>
+              <a:rPr/>
+              <a:t> </a:t>
+            </a:r>
+            <a:r>
+              <a:rPr/>
+              <a:t>of</a:t>
+            </a:r>
+            <a:r>
+              <a:rPr/>
+              <a:t> </a:t>
+            </a:r>
+            <a:r>
+              <a:rPr/>
+              <a:t>Hadoop,</a:t>
+            </a:r>
+            <a:r>
+              <a:rPr/>
+              <a:t> </a:t>
+            </a:r>
+            <a:r>
+              <a:rPr/>
+              <a:t>it</a:t>
+            </a:r>
+            <a:r>
+              <a:rPr/>
+              <a:t> </a:t>
+            </a:r>
+            <a:r>
+              <a:rPr/>
+              <a:t>was</a:t>
+            </a:r>
+            <a:r>
+              <a:rPr/>
+              <a:t> </a:t>
+            </a:r>
+            <a:r>
+              <a:rPr/>
+              <a:t>originally</a:t>
+            </a:r>
+            <a:r>
+              <a:rPr/>
+              <a:t> </a:t>
+            </a:r>
+            <a:r>
+              <a:rPr/>
+              <a:t>developed</a:t>
+            </a:r>
+            <a:r>
+              <a:rPr/>
+              <a:t> </a:t>
+            </a:r>
+            <a:r>
+              <a:rPr/>
+              <a:t>by</a:t>
+            </a:r>
+            <a:r>
+              <a:rPr/>
+              <a:t> </a:t>
+            </a:r>
+            <a:r>
+              <a:rPr/>
+              <a:t>Google</a:t>
+            </a:r>
+            <a:r>
+              <a:rPr/>
+              <a:t> </a:t>
+            </a:r>
+            <a:r>
+              <a:rPr/>
+              <a:t>prior</a:t>
+            </a:r>
+            <a:r>
+              <a:rPr/>
+              <a:t> </a:t>
+            </a:r>
+            <a:r>
+              <a:rPr/>
+              <a:t>to</a:t>
+            </a:r>
+            <a:r>
+              <a:rPr/>
+              <a:t> </a:t>
+            </a:r>
+            <a:r>
+              <a:rPr/>
+              <a:t>the</a:t>
+            </a:r>
+            <a:r>
+              <a:rPr/>
+              <a:t> </a:t>
+            </a:r>
+            <a:r>
+              <a:rPr/>
+              <a:t>development</a:t>
+            </a:r>
+            <a:r>
+              <a:rPr/>
+              <a:t> </a:t>
+            </a:r>
+            <a:r>
+              <a:rPr/>
+              <a:t>of</a:t>
+            </a:r>
+            <a:r>
+              <a:rPr/>
+              <a:t> </a:t>
+            </a:r>
+            <a:r>
+              <a:rPr/>
+              <a:t>Hadoop.</a:t>
+            </a:r>
+            <a:r>
+              <a:rPr/>
+              <a:t> </a:t>
+            </a:r>
+            <a:r>
+              <a:rPr/>
+              <a:t>The</a:t>
+            </a:r>
+            <a:r>
+              <a:rPr/>
+              <a:t> </a:t>
+            </a:r>
+            <a:r>
+              <a:rPr/>
+              <a:t>term</a:t>
+            </a:r>
+            <a:r>
+              <a:rPr/>
+              <a:t> </a:t>
+            </a:r>
+            <a:r>
+              <a:rPr/>
+              <a:t>“</a:t>
+            </a:r>
+            <a:r>
+              <a:rPr/>
+              <a:t>mapreduce</a:t>
+            </a:r>
+            <a:r>
+              <a:rPr/>
+              <a:t>”</a:t>
+            </a:r>
+            <a:r>
+              <a:rPr/>
+              <a:t> </a:t>
+            </a:r>
+            <a:r>
+              <a:rPr/>
+              <a:t>has</a:t>
+            </a:r>
+            <a:r>
+              <a:rPr/>
+              <a:t> </a:t>
+            </a:r>
+            <a:r>
+              <a:rPr/>
+              <a:t>become</a:t>
+            </a:r>
+            <a:r>
+              <a:rPr/>
+              <a:t> </a:t>
+            </a:r>
+            <a:r>
+              <a:rPr/>
+              <a:t>a</a:t>
+            </a:r>
+            <a:r>
+              <a:rPr/>
+              <a:t> </a:t>
+            </a:r>
+            <a:r>
+              <a:rPr/>
+              <a:t>generic</a:t>
+            </a:r>
+            <a:r>
+              <a:rPr/>
+              <a:t> </a:t>
+            </a:r>
+            <a:r>
+              <a:rPr/>
+              <a:t>term</a:t>
+            </a:r>
+            <a:r>
+              <a:rPr/>
+              <a:t> </a:t>
+            </a:r>
+            <a:r>
+              <a:rPr/>
+              <a:t>for</a:t>
+            </a:r>
+            <a:r>
+              <a:rPr/>
+              <a:t> </a:t>
+            </a:r>
+            <a:r>
+              <a:rPr/>
+              <a:t>the</a:t>
+            </a:r>
+            <a:r>
+              <a:rPr/>
+              <a:t> </a:t>
+            </a:r>
+            <a:r>
+              <a:rPr/>
+              <a:t>algorithmic</a:t>
+            </a:r>
+            <a:r>
+              <a:rPr/>
+              <a:t> </a:t>
+            </a:r>
+            <a:r>
+              <a:rPr/>
+              <a:t>process.</a:t>
+            </a:r>
+          </a:p>
+          <a:p>
+            <a:pPr lvl="0" marL="0" indent="0">
+              <a:buNone/>
+            </a:pPr>
+          </a:p>
+          <a:p>
+            <a:pPr lvl="0" marL="0" indent="0">
+              <a:buNone/>
+            </a:pPr>
+            <a:r>
+              <a:rPr/>
+              <a:t>This</a:t>
+            </a:r>
+            <a:r>
+              <a:rPr/>
+              <a:t> </a:t>
+            </a:r>
+            <a:r>
+              <a:rPr/>
+              <a:t>is</a:t>
+            </a:r>
+            <a:r>
+              <a:rPr/>
+              <a:t> </a:t>
+            </a:r>
+            <a:r>
+              <a:rPr/>
+              <a:t>an</a:t>
+            </a:r>
+            <a:r>
+              <a:rPr/>
+              <a:t> </a:t>
+            </a:r>
+            <a:r>
+              <a:rPr/>
+              <a:t>image</a:t>
+            </a:r>
+            <a:r>
+              <a:rPr/>
+              <a:t> </a:t>
+            </a:r>
+            <a:r>
+              <a:rPr/>
+              <a:t>from</a:t>
+            </a:r>
+            <a:r>
+              <a:rPr/>
+              <a:t> </a:t>
+            </a:r>
+            <a:r>
+              <a:rPr/>
+              <a:t>a</a:t>
+            </a:r>
+            <a:r>
+              <a:rPr/>
+              <a:t> </a:t>
+            </a:r>
+            <a:r>
+              <a:rPr/>
+              <a:t>blog</a:t>
+            </a:r>
+            <a:r>
+              <a:rPr/>
+              <a:t> </a:t>
+            </a:r>
+            <a:r>
+              <a:rPr/>
+              <a:t>posting</a:t>
+            </a:r>
+            <a:r>
+              <a:rPr/>
+              <a:t> </a:t>
+            </a:r>
+            <a:r>
+              <a:rPr/>
+              <a:t>on</a:t>
+            </a:r>
+            <a:r>
+              <a:rPr/>
+              <a:t> </a:t>
+            </a:r>
+            <a:r>
+              <a:rPr/>
+              <a:t>MapReduce</a:t>
+            </a:r>
+            <a:r>
+              <a:rPr/>
+              <a:t> </a:t>
+            </a:r>
+            <a:r>
+              <a:rPr/>
+              <a:t>written</a:t>
+            </a:r>
+            <a:r>
+              <a:rPr/>
+              <a:t> </a:t>
+            </a:r>
+            <a:r>
+              <a:rPr/>
+              <a:t>by</a:t>
+            </a:r>
+            <a:r>
+              <a:rPr/>
+              <a:t> </a:t>
+            </a:r>
+            <a:r>
+              <a:rPr/>
+              <a:t>Martijn</a:t>
+            </a:r>
+            <a:r>
+              <a:rPr/>
+              <a:t> </a:t>
+            </a:r>
+            <a:r>
+              <a:rPr/>
+              <a:t>van</a:t>
+            </a:r>
+            <a:r>
+              <a:rPr/>
+              <a:t> </a:t>
+            </a:r>
+            <a:r>
+              <a:rPr/>
+              <a:t>Groningen</a:t>
+            </a:r>
+            <a:r>
+              <a:rPr/>
+              <a:t> </a:t>
+            </a:r>
+            <a:r>
+              <a:rPr/>
+              <a:t>for</a:t>
+            </a:r>
+            <a:r>
+              <a:rPr/>
+              <a:t> </a:t>
+            </a:r>
+            <a:r>
+              <a:rPr/>
+              <a:t>the</a:t>
+            </a:r>
+            <a:r>
+              <a:rPr/>
+              <a:t> </a:t>
+            </a:r>
+            <a:r>
+              <a:rPr/>
+              <a:t>Trifork</a:t>
+            </a:r>
+            <a:r>
+              <a:rPr/>
+              <a:t> </a:t>
+            </a:r>
+            <a:r>
+              <a:rPr/>
+              <a:t>blog</a:t>
+            </a:r>
+            <a:r>
+              <a:rPr/>
+              <a:t> </a:t>
+            </a:r>
+            <a:r>
+              <a:rPr/>
+              <a:t>(</a:t>
+            </a:r>
+            <a:r>
+              <a:rPr/>
+              <a:t>https://blog.trifork.com/2009/08/04/introduction-to-hadoop/</a:t>
+            </a:r>
+            <a:r>
+              <a:rPr/>
+              <a:t>).</a:t>
+            </a:r>
+            <a:r>
+              <a:rPr/>
+              <a:t> </a:t>
+            </a:r>
+            <a:r>
+              <a:rPr/>
+              <a:t>This</a:t>
+            </a:r>
+            <a:r>
+              <a:rPr/>
+              <a:t> </a:t>
+            </a:r>
+            <a:r>
+              <a:rPr/>
+              <a:t>image</a:t>
+            </a:r>
+            <a:r>
+              <a:rPr/>
+              <a:t> </a:t>
+            </a:r>
+            <a:r>
+              <a:rPr/>
+              <a:t>is</a:t>
+            </a:r>
+            <a:r>
+              <a:rPr/>
+              <a:t> </a:t>
+            </a:r>
+            <a:r>
+              <a:rPr/>
+              <a:t>copyrighted,</a:t>
+            </a:r>
+            <a:r>
+              <a:rPr/>
+              <a:t> </a:t>
+            </a:r>
+            <a:r>
+              <a:rPr/>
+              <a:t>and</a:t>
+            </a:r>
+            <a:r>
+              <a:rPr/>
+              <a:t> </a:t>
+            </a:r>
+            <a:r>
+              <a:rPr/>
+              <a:t>is</a:t>
+            </a:r>
+            <a:r>
+              <a:rPr/>
+              <a:t> </a:t>
+            </a:r>
+            <a:r>
+              <a:rPr/>
+              <a:t>used</a:t>
+            </a:r>
+            <a:r>
+              <a:rPr/>
+              <a:t> </a:t>
+            </a:r>
+            <a:r>
+              <a:rPr/>
+              <a:t>here</a:t>
+            </a:r>
+            <a:r>
+              <a:rPr/>
+              <a:t> </a:t>
+            </a:r>
+            <a:r>
+              <a:rPr/>
+              <a:t>under</a:t>
+            </a:r>
+            <a:r>
+              <a:rPr/>
+              <a:t> </a:t>
+            </a:r>
+            <a:r>
+              <a:rPr/>
+              <a:t>the</a:t>
+            </a:r>
+            <a:r>
+              <a:rPr/>
+              <a:t> </a:t>
+            </a:r>
+            <a:r>
+              <a:rPr/>
+              <a:t>fair</a:t>
+            </a:r>
+            <a:r>
+              <a:rPr/>
+              <a:t> </a:t>
+            </a:r>
+            <a:r>
+              <a:rPr/>
+              <a:t>use</a:t>
+            </a:r>
+            <a:r>
+              <a:rPr/>
+              <a:t> </a:t>
+            </a:r>
+            <a:r>
+              <a:rPr/>
+              <a:t>provisions</a:t>
+            </a:r>
+            <a:r>
+              <a:rPr/>
+              <a:t> </a:t>
+            </a:r>
+            <a:r>
+              <a:rPr/>
+              <a:t>of</a:t>
+            </a:r>
+            <a:r>
+              <a:rPr/>
+              <a:t> </a:t>
+            </a:r>
+            <a:r>
+              <a:rPr/>
+              <a:t>copyright</a:t>
+            </a:r>
+            <a:r>
+              <a:rPr/>
+              <a:t> </a:t>
+            </a:r>
+            <a:r>
+              <a:rPr/>
+              <a:t>law.</a:t>
             </a:r>
           </a:p>
         </p:txBody>
@@ -3675,6 +4532,772 @@
             <a:fld id="{18BDFEC3-8487-43E8-A154-7C12CBC1FFF2}" type="slidenum">
               <a:rPr lang="en-US"/>
               <a:t>8</a:t>
+            </a:fld>
+            <a:endParaRPr lang="en-US"/>
+          </a:p>
+        </p:txBody>
+      </p:sp>
+    </p:spTree>
+  </p:cSld>
+</p:notes>
+</file>
+
+<file path=ppt/notesSlides/notesSlide7.xml><?xml version="1.0" encoding="utf-8"?>
+<p:notes xmlns:a="http://schemas.openxmlformats.org/drawingml/2006/main" xmlns:r="http://schemas.openxmlformats.org/officeDocument/2006/relationships" xmlns:p="http://schemas.openxmlformats.org/presentationml/2006/main">
+  <p:cSld>
+    <p:spTree>
+      <p:nvGrpSpPr>
+        <p:cNvPr id="1" name=""/>
+        <p:cNvGrpSpPr/>
+        <p:nvPr/>
+      </p:nvGrpSpPr>
+      <p:grpSpPr>
+        <a:xfrm>
+          <a:off x="0" y="0"/>
+          <a:ext cx="0" cy="0"/>
+          <a:chOff x="0" y="0"/>
+          <a:chExt cx="0" cy="0"/>
+        </a:xfrm>
+      </p:grpSpPr>
+      <p:sp>
+        <p:nvSpPr>
+          <p:cNvPr id="2" name="Slide Image Placeholder 1"/>
+          <p:cNvSpPr>
+            <a:spLocks noGrp="1" noRot="1" noChangeAspect="1"/>
+          </p:cNvSpPr>
+          <p:nvPr>
+            <p:ph type="sldImg"/>
+          </p:nvPr>
+        </p:nvSpPr>
+        <p:spPr/>
+      </p:sp>
+      <p:sp>
+        <p:nvSpPr>
+          <p:cNvPr id="3" name="Notes Placeholder 2"/>
+          <p:cNvSpPr>
+            <a:spLocks noGrp="1"/>
+          </p:cNvSpPr>
+          <p:nvPr>
+            <p:ph type="body" idx="1"/>
+          </p:nvPr>
+        </p:nvSpPr>
+        <p:spPr/>
+        <p:txBody>
+          <a:bodyPr/>
+          <a:lstStyle/>
+          <a:p>
+            <a:pPr lvl="0" marL="0" indent="0">
+              <a:buNone/>
+            </a:pPr>
+            <a:r>
+              <a:rPr/>
+              <a:t>This</a:t>
+            </a:r>
+            <a:r>
+              <a:rPr/>
+              <a:t> </a:t>
+            </a:r>
+            <a:r>
+              <a:rPr/>
+              <a:t>is</a:t>
+            </a:r>
+            <a:r>
+              <a:rPr/>
+              <a:t> </a:t>
+            </a:r>
+            <a:r>
+              <a:rPr/>
+              <a:t>an</a:t>
+            </a:r>
+            <a:r>
+              <a:rPr/>
+              <a:t> </a:t>
+            </a:r>
+            <a:r>
+              <a:rPr/>
+              <a:t>image</a:t>
+            </a:r>
+            <a:r>
+              <a:rPr/>
+              <a:t> </a:t>
+            </a:r>
+            <a:r>
+              <a:rPr/>
+              <a:t>from</a:t>
+            </a:r>
+            <a:r>
+              <a:rPr/>
+              <a:t> </a:t>
+            </a:r>
+            <a:r>
+              <a:rPr/>
+              <a:t>a</a:t>
+            </a:r>
+            <a:r>
+              <a:rPr/>
+              <a:t> </a:t>
+            </a:r>
+            <a:r>
+              <a:rPr/>
+              <a:t>tutorial</a:t>
+            </a:r>
+            <a:r>
+              <a:rPr/>
+              <a:t> </a:t>
+            </a:r>
+            <a:r>
+              <a:rPr/>
+              <a:t>on</a:t>
+            </a:r>
+            <a:r>
+              <a:rPr/>
+              <a:t> </a:t>
+            </a:r>
+            <a:r>
+              <a:rPr/>
+              <a:t>HDFS</a:t>
+            </a:r>
+            <a:r>
+              <a:rPr/>
+              <a:t> </a:t>
+            </a:r>
+            <a:r>
+              <a:rPr/>
+              <a:t>on</a:t>
+            </a:r>
+            <a:r>
+              <a:rPr/>
+              <a:t> </a:t>
+            </a:r>
+            <a:r>
+              <a:rPr/>
+              <a:t>the</a:t>
+            </a:r>
+            <a:r>
+              <a:rPr/>
+              <a:t> </a:t>
+            </a:r>
+            <a:r>
+              <a:rPr/>
+              <a:t>Apache</a:t>
+            </a:r>
+            <a:r>
+              <a:rPr/>
+              <a:t> </a:t>
+            </a:r>
+            <a:r>
+              <a:rPr/>
+              <a:t>Spark</a:t>
+            </a:r>
+            <a:r>
+              <a:rPr/>
+              <a:t> </a:t>
+            </a:r>
+            <a:r>
+              <a:rPr/>
+              <a:t>website</a:t>
+            </a:r>
+            <a:r>
+              <a:rPr/>
+              <a:t> </a:t>
+            </a:r>
+            <a:r>
+              <a:rPr/>
+              <a:t>written</a:t>
+            </a:r>
+            <a:r>
+              <a:rPr/>
+              <a:t> </a:t>
+            </a:r>
+            <a:r>
+              <a:rPr/>
+              <a:t>(</a:t>
+            </a:r>
+            <a:r>
+              <a:rPr/>
+              <a:t>https://hadoop.apache.org/docs/r1.2.1/hdfs_design.html#NameNode+and+DataNodes</a:t>
+            </a:r>
+            <a:r>
+              <a:rPr/>
+              <a:t>).</a:t>
+            </a:r>
+            <a:r>
+              <a:rPr/>
+              <a:t> </a:t>
+            </a:r>
+            <a:r>
+              <a:rPr/>
+              <a:t>This</a:t>
+            </a:r>
+            <a:r>
+              <a:rPr/>
+              <a:t> </a:t>
+            </a:r>
+            <a:r>
+              <a:rPr/>
+              <a:t>image</a:t>
+            </a:r>
+            <a:r>
+              <a:rPr/>
+              <a:t> </a:t>
+            </a:r>
+            <a:r>
+              <a:rPr/>
+              <a:t>is</a:t>
+            </a:r>
+            <a:r>
+              <a:rPr/>
+              <a:t> </a:t>
+            </a:r>
+            <a:r>
+              <a:rPr/>
+              <a:t>copyrighted</a:t>
+            </a:r>
+            <a:r>
+              <a:rPr/>
+              <a:t> </a:t>
+            </a:r>
+            <a:r>
+              <a:rPr/>
+              <a:t>and</a:t>
+            </a:r>
+            <a:r>
+              <a:rPr/>
+              <a:t> </a:t>
+            </a:r>
+            <a:r>
+              <a:rPr/>
+              <a:t>is</a:t>
+            </a:r>
+            <a:r>
+              <a:rPr/>
+              <a:t> </a:t>
+            </a:r>
+            <a:r>
+              <a:rPr/>
+              <a:t>used</a:t>
+            </a:r>
+            <a:r>
+              <a:rPr/>
+              <a:t> </a:t>
+            </a:r>
+            <a:r>
+              <a:rPr/>
+              <a:t>under</a:t>
+            </a:r>
+            <a:r>
+              <a:rPr/>
+              <a:t> </a:t>
+            </a:r>
+            <a:r>
+              <a:rPr/>
+              <a:t>the</a:t>
+            </a:r>
+            <a:r>
+              <a:rPr/>
+              <a:t> </a:t>
+            </a:r>
+            <a:r>
+              <a:rPr/>
+              <a:t>fair</a:t>
+            </a:r>
+            <a:r>
+              <a:rPr/>
+              <a:t> </a:t>
+            </a:r>
+            <a:r>
+              <a:rPr/>
+              <a:t>use</a:t>
+            </a:r>
+            <a:r>
+              <a:rPr/>
+              <a:t> </a:t>
+            </a:r>
+            <a:r>
+              <a:rPr/>
+              <a:t>provisions</a:t>
+            </a:r>
+            <a:r>
+              <a:rPr/>
+              <a:t> </a:t>
+            </a:r>
+            <a:r>
+              <a:rPr/>
+              <a:t>of</a:t>
+            </a:r>
+            <a:r>
+              <a:rPr/>
+              <a:t> </a:t>
+            </a:r>
+            <a:r>
+              <a:rPr/>
+              <a:t>copyright</a:t>
+            </a:r>
+            <a:r>
+              <a:rPr/>
+              <a:t> </a:t>
+            </a:r>
+            <a:r>
+              <a:rPr/>
+              <a:t>law.</a:t>
+            </a:r>
+          </a:p>
+        </p:txBody>
+      </p:sp>
+      <p:sp>
+        <p:nvSpPr>
+          <p:cNvPr id="4" name="Slide Number Placeholder 3"/>
+          <p:cNvSpPr>
+            <a:spLocks noGrp="1"/>
+          </p:cNvSpPr>
+          <p:nvPr>
+            <p:ph type="sldNum" sz="quarter" idx="10"/>
+          </p:nvPr>
+        </p:nvSpPr>
+        <p:spPr/>
+        <p:txBody>
+          <a:bodyPr/>
+          <a:lstStyle/>
+          <a:p>
+            <a:fld id="{18BDFEC3-8487-43E8-A154-7C12CBC1FFF2}" type="slidenum">
+              <a:rPr lang="en-US"/>
+              <a:t>9</a:t>
+            </a:fld>
+            <a:endParaRPr lang="en-US"/>
+          </a:p>
+        </p:txBody>
+      </p:sp>
+    </p:spTree>
+  </p:cSld>
+</p:notes>
+</file>
+
+<file path=ppt/notesSlides/notesSlide8.xml><?xml version="1.0" encoding="utf-8"?>
+<p:notes xmlns:a="http://schemas.openxmlformats.org/drawingml/2006/main" xmlns:r="http://schemas.openxmlformats.org/officeDocument/2006/relationships" xmlns:p="http://schemas.openxmlformats.org/presentationml/2006/main">
+  <p:cSld>
+    <p:spTree>
+      <p:nvGrpSpPr>
+        <p:cNvPr id="1" name=""/>
+        <p:cNvGrpSpPr/>
+        <p:nvPr/>
+      </p:nvGrpSpPr>
+      <p:grpSpPr>
+        <a:xfrm>
+          <a:off x="0" y="0"/>
+          <a:ext cx="0" cy="0"/>
+          <a:chOff x="0" y="0"/>
+          <a:chExt cx="0" cy="0"/>
+        </a:xfrm>
+      </p:grpSpPr>
+      <p:sp>
+        <p:nvSpPr>
+          <p:cNvPr id="2" name="Slide Image Placeholder 1"/>
+          <p:cNvSpPr>
+            <a:spLocks noGrp="1" noRot="1" noChangeAspect="1"/>
+          </p:cNvSpPr>
+          <p:nvPr>
+            <p:ph type="sldImg"/>
+          </p:nvPr>
+        </p:nvSpPr>
+        <p:spPr/>
+      </p:sp>
+      <p:sp>
+        <p:nvSpPr>
+          <p:cNvPr id="3" name="Notes Placeholder 2"/>
+          <p:cNvSpPr>
+            <a:spLocks noGrp="1"/>
+          </p:cNvSpPr>
+          <p:nvPr>
+            <p:ph type="body" idx="1"/>
+          </p:nvPr>
+        </p:nvSpPr>
+        <p:spPr/>
+        <p:txBody>
+          <a:bodyPr/>
+          <a:lstStyle/>
+          <a:p>
+            <a:pPr lvl="0" marL="0" indent="0">
+              <a:buNone/>
+            </a:pPr>
+            <a:r>
+              <a:rPr/>
+              <a:t>This</a:t>
+            </a:r>
+            <a:r>
+              <a:rPr/>
+              <a:t> </a:t>
+            </a:r>
+            <a:r>
+              <a:rPr/>
+              <a:t>is</a:t>
+            </a:r>
+            <a:r>
+              <a:rPr/>
+              <a:t> </a:t>
+            </a:r>
+            <a:r>
+              <a:rPr/>
+              <a:t>a</a:t>
+            </a:r>
+            <a:r>
+              <a:rPr/>
+              <a:t> </a:t>
+            </a:r>
+            <a:r>
+              <a:rPr/>
+              <a:t>screen</a:t>
+            </a:r>
+            <a:r>
+              <a:rPr/>
+              <a:t> </a:t>
+            </a:r>
+            <a:r>
+              <a:rPr/>
+              <a:t>shot</a:t>
+            </a:r>
+            <a:r>
+              <a:rPr/>
+              <a:t> </a:t>
+            </a:r>
+            <a:r>
+              <a:rPr/>
+              <a:t>from</a:t>
+            </a:r>
+            <a:r>
+              <a:rPr/>
+              <a:t> </a:t>
+            </a:r>
+            <a:r>
+              <a:rPr/>
+              <a:t>the</a:t>
+            </a:r>
+            <a:r>
+              <a:rPr/>
+              <a:t> </a:t>
+            </a:r>
+            <a:r>
+              <a:rPr/>
+              <a:t>main</a:t>
+            </a:r>
+            <a:r>
+              <a:rPr/>
+              <a:t> </a:t>
+            </a:r>
+            <a:r>
+              <a:rPr/>
+              <a:t>page</a:t>
+            </a:r>
+            <a:r>
+              <a:rPr/>
+              <a:t> </a:t>
+            </a:r>
+            <a:r>
+              <a:rPr/>
+              <a:t>of</a:t>
+            </a:r>
+            <a:r>
+              <a:rPr/>
+              <a:t> </a:t>
+            </a:r>
+            <a:r>
+              <a:rPr/>
+              <a:t>the</a:t>
+            </a:r>
+            <a:r>
+              <a:rPr/>
+              <a:t> </a:t>
+            </a:r>
+            <a:r>
+              <a:rPr/>
+              <a:t>Apache</a:t>
+            </a:r>
+            <a:r>
+              <a:rPr/>
+              <a:t> </a:t>
+            </a:r>
+            <a:r>
+              <a:rPr/>
+              <a:t>Spark</a:t>
+            </a:r>
+            <a:r>
+              <a:rPr/>
+              <a:t> </a:t>
+            </a:r>
+            <a:r>
+              <a:rPr/>
+              <a:t>website</a:t>
+            </a:r>
+            <a:r>
+              <a:rPr/>
+              <a:t> </a:t>
+            </a:r>
+            <a:r>
+              <a:rPr/>
+              <a:t>(</a:t>
+            </a:r>
+            <a:r>
+              <a:rPr/>
+              <a:t>https://spark.apache.org/</a:t>
+            </a:r>
+            <a:r>
+              <a:rPr/>
+              <a:t>).</a:t>
+            </a:r>
+            <a:r>
+              <a:rPr/>
+              <a:t> </a:t>
+            </a:r>
+            <a:r>
+              <a:rPr/>
+              <a:t>This</a:t>
+            </a:r>
+            <a:r>
+              <a:rPr/>
+              <a:t> </a:t>
+            </a:r>
+            <a:r>
+              <a:rPr/>
+              <a:t>website</a:t>
+            </a:r>
+            <a:r>
+              <a:rPr/>
+              <a:t> </a:t>
+            </a:r>
+            <a:r>
+              <a:rPr/>
+              <a:t>is</a:t>
+            </a:r>
+            <a:r>
+              <a:rPr/>
+              <a:t> </a:t>
+            </a:r>
+            <a:r>
+              <a:rPr/>
+              <a:t>copyrighted,</a:t>
+            </a:r>
+            <a:r>
+              <a:rPr/>
+              <a:t> </a:t>
+            </a:r>
+            <a:r>
+              <a:rPr/>
+              <a:t>and</a:t>
+            </a:r>
+            <a:r>
+              <a:rPr/>
+              <a:t> </a:t>
+            </a:r>
+            <a:r>
+              <a:rPr/>
+              <a:t>this</a:t>
+            </a:r>
+            <a:r>
+              <a:rPr/>
+              <a:t> </a:t>
+            </a:r>
+            <a:r>
+              <a:rPr/>
+              <a:t>screenshot</a:t>
+            </a:r>
+            <a:r>
+              <a:rPr/>
+              <a:t> </a:t>
+            </a:r>
+            <a:r>
+              <a:rPr/>
+              <a:t>is</a:t>
+            </a:r>
+            <a:r>
+              <a:rPr/>
+              <a:t> </a:t>
+            </a:r>
+            <a:r>
+              <a:rPr/>
+              <a:t>used</a:t>
+            </a:r>
+            <a:r>
+              <a:rPr/>
+              <a:t> </a:t>
+            </a:r>
+            <a:r>
+              <a:rPr/>
+              <a:t>under</a:t>
+            </a:r>
+            <a:r>
+              <a:rPr/>
+              <a:t> </a:t>
+            </a:r>
+            <a:r>
+              <a:rPr/>
+              <a:t>the</a:t>
+            </a:r>
+            <a:r>
+              <a:rPr/>
+              <a:t> </a:t>
+            </a:r>
+            <a:r>
+              <a:rPr/>
+              <a:t>fair</a:t>
+            </a:r>
+            <a:r>
+              <a:rPr/>
+              <a:t> </a:t>
+            </a:r>
+            <a:r>
+              <a:rPr/>
+              <a:t>use</a:t>
+            </a:r>
+            <a:r>
+              <a:rPr/>
+              <a:t> </a:t>
+            </a:r>
+            <a:r>
+              <a:rPr/>
+              <a:t>provisions</a:t>
+            </a:r>
+            <a:r>
+              <a:rPr/>
+              <a:t> </a:t>
+            </a:r>
+            <a:r>
+              <a:rPr/>
+              <a:t>of</a:t>
+            </a:r>
+            <a:r>
+              <a:rPr/>
+              <a:t> </a:t>
+            </a:r>
+            <a:r>
+              <a:rPr/>
+              <a:t>copyright</a:t>
+            </a:r>
+            <a:r>
+              <a:rPr/>
+              <a:t> </a:t>
+            </a:r>
+            <a:r>
+              <a:rPr/>
+              <a:t>law.</a:t>
+            </a:r>
+          </a:p>
+        </p:txBody>
+      </p:sp>
+      <p:sp>
+        <p:nvSpPr>
+          <p:cNvPr id="4" name="Slide Number Placeholder 3"/>
+          <p:cNvSpPr>
+            <a:spLocks noGrp="1"/>
+          </p:cNvSpPr>
+          <p:nvPr>
+            <p:ph type="sldNum" sz="quarter" idx="10"/>
+          </p:nvPr>
+        </p:nvSpPr>
+        <p:spPr/>
+        <p:txBody>
+          <a:bodyPr/>
+          <a:lstStyle/>
+          <a:p>
+            <a:fld id="{18BDFEC3-8487-43E8-A154-7C12CBC1FFF2}" type="slidenum">
+              <a:rPr lang="en-US"/>
+              <a:t>12</a:t>
+            </a:fld>
+            <a:endParaRPr lang="en-US"/>
+          </a:p>
+        </p:txBody>
+      </p:sp>
+    </p:spTree>
+  </p:cSld>
+</p:notes>
+</file>
+
+<file path=ppt/notesSlides/notesSlide9.xml><?xml version="1.0" encoding="utf-8"?>
+<p:notes xmlns:a="http://schemas.openxmlformats.org/drawingml/2006/main" xmlns:r="http://schemas.openxmlformats.org/officeDocument/2006/relationships" xmlns:p="http://schemas.openxmlformats.org/presentationml/2006/main">
+  <p:cSld>
+    <p:spTree>
+      <p:nvGrpSpPr>
+        <p:cNvPr id="1" name=""/>
+        <p:cNvGrpSpPr/>
+        <p:nvPr/>
+      </p:nvGrpSpPr>
+      <p:grpSpPr>
+        <a:xfrm>
+          <a:off x="0" y="0"/>
+          <a:ext cx="0" cy="0"/>
+          <a:chOff x="0" y="0"/>
+          <a:chExt cx="0" cy="0"/>
+        </a:xfrm>
+      </p:grpSpPr>
+      <p:sp>
+        <p:nvSpPr>
+          <p:cNvPr id="2" name="Slide Image Placeholder 1"/>
+          <p:cNvSpPr>
+            <a:spLocks noGrp="1" noRot="1" noChangeAspect="1"/>
+          </p:cNvSpPr>
+          <p:nvPr>
+            <p:ph type="sldImg"/>
+          </p:nvPr>
+        </p:nvSpPr>
+        <p:spPr/>
+      </p:sp>
+      <p:sp>
+        <p:nvSpPr>
+          <p:cNvPr id="3" name="Notes Placeholder 2"/>
+          <p:cNvSpPr>
+            <a:spLocks noGrp="1"/>
+          </p:cNvSpPr>
+          <p:nvPr>
+            <p:ph type="body" idx="1"/>
+          </p:nvPr>
+        </p:nvSpPr>
+        <p:spPr/>
+        <p:txBody>
+          <a:bodyPr/>
+          <a:lstStyle/>
+          <a:p>
+            <a:pPr lvl="0" marL="0" indent="0">
+              <a:buNone/>
+            </a:pPr>
+            <a:r>
+              <a:rPr/>
+              <a:t>In</a:t>
+            </a:r>
+            <a:r>
+              <a:rPr/>
+              <a:t> </a:t>
+            </a:r>
+            <a:r>
+              <a:rPr/>
+              <a:t>summary,</a:t>
+            </a:r>
+            <a:r>
+              <a:rPr/>
+              <a:t> </a:t>
+            </a:r>
+            <a:r>
+              <a:rPr/>
+              <a:t>…</a:t>
+            </a:r>
+          </a:p>
+        </p:txBody>
+      </p:sp>
+      <p:sp>
+        <p:nvSpPr>
+          <p:cNvPr id="4" name="Slide Number Placeholder 3"/>
+          <p:cNvSpPr>
+            <a:spLocks noGrp="1"/>
+          </p:cNvSpPr>
+          <p:nvPr>
+            <p:ph type="sldNum" sz="quarter" idx="10"/>
+          </p:nvPr>
+        </p:nvSpPr>
+        <p:spPr/>
+        <p:txBody>
+          <a:bodyPr/>
+          <a:lstStyle/>
+          <a:p>
+            <a:fld id="{18BDFEC3-8487-43E8-A154-7C12CBC1FFF2}" type="slidenum">
+              <a:rPr lang="en-US"/>
+              <a:t>13</a:t>
             </a:fld>
             <a:endParaRPr lang="en-US"/>
           </a:p>
@@ -6788,6 +8411,376 @@
 </p:sld>
 </file>
 
+<file path=ppt/slides/slide10.xml><?xml version="1.0" encoding="utf-8"?>
+<p:sld xmlns:a="http://schemas.openxmlformats.org/drawingml/2006/main" xmlns:r="http://schemas.openxmlformats.org/officeDocument/2006/relationships" xmlns:p="http://schemas.openxmlformats.org/presentationml/2006/main">
+  <p:cSld>
+    <p:spTree>
+      <p:nvGrpSpPr>
+        <p:cNvPr id="1" name=""/>
+        <p:cNvGrpSpPr/>
+        <p:nvPr/>
+      </p:nvGrpSpPr>
+      <p:grpSpPr>
+        <a:xfrm>
+          <a:off x="0" y="0"/>
+          <a:ext cx="0" cy="0"/>
+          <a:chOff x="0" y="0"/>
+          <a:chExt cx="0" cy="0"/>
+        </a:xfrm>
+      </p:grpSpPr>
+      <p:sp>
+        <p:nvSpPr>
+          <p:cNvPr id="2" name="Title 1"/>
+          <p:cNvSpPr>
+            <a:spLocks noGrp="1"/>
+          </p:cNvSpPr>
+          <p:nvPr>
+            <p:ph type="title"/>
+          </p:nvPr>
+        </p:nvSpPr>
+        <p:spPr/>
+        <p:txBody>
+          <a:bodyPr/>
+          <a:lstStyle/>
+          <a:p>
+            <a:pPr lvl="0" marL="0" indent="0">
+              <a:buNone/>
+            </a:pPr>
+            <a:r>
+              <a:rPr/>
+              <a:t>Pig</a:t>
+            </a:r>
+          </a:p>
+        </p:txBody>
+      </p:sp>
+    </p:spTree>
+  </p:cSld>
+</p:sld>
+</file>
+
+<file path=ppt/slides/slide11.xml><?xml version="1.0" encoding="utf-8"?>
+<p:sld xmlns:a="http://schemas.openxmlformats.org/drawingml/2006/main" xmlns:r="http://schemas.openxmlformats.org/officeDocument/2006/relationships" xmlns:p="http://schemas.openxmlformats.org/presentationml/2006/main">
+  <p:cSld>
+    <p:spTree>
+      <p:nvGrpSpPr>
+        <p:cNvPr id="1" name=""/>
+        <p:cNvGrpSpPr/>
+        <p:nvPr/>
+      </p:nvGrpSpPr>
+      <p:grpSpPr>
+        <a:xfrm>
+          <a:off x="0" y="0"/>
+          <a:ext cx="0" cy="0"/>
+          <a:chOff x="0" y="0"/>
+          <a:chExt cx="0" cy="0"/>
+        </a:xfrm>
+      </p:grpSpPr>
+      <p:sp>
+        <p:nvSpPr>
+          <p:cNvPr id="2" name="Title 1"/>
+          <p:cNvSpPr>
+            <a:spLocks noGrp="1"/>
+          </p:cNvSpPr>
+          <p:nvPr>
+            <p:ph type="title"/>
+          </p:nvPr>
+        </p:nvSpPr>
+        <p:spPr/>
+        <p:txBody>
+          <a:bodyPr/>
+          <a:lstStyle/>
+          <a:p>
+            <a:pPr lvl="0" marL="0" indent="0">
+              <a:buNone/>
+            </a:pPr>
+            <a:r>
+              <a:rPr/>
+              <a:t>Hive</a:t>
+            </a:r>
+          </a:p>
+        </p:txBody>
+      </p:sp>
+    </p:spTree>
+  </p:cSld>
+</p:sld>
+</file>
+
+<file path=ppt/slides/slide12.xml><?xml version="1.0" encoding="utf-8"?>
+<p:sld xmlns:a="http://schemas.openxmlformats.org/drawingml/2006/main" xmlns:r="http://schemas.openxmlformats.org/officeDocument/2006/relationships" xmlns:p="http://schemas.openxmlformats.org/presentationml/2006/main">
+  <p:cSld>
+    <p:spTree>
+      <p:nvGrpSpPr>
+        <p:cNvPr id="1" name=""/>
+        <p:cNvGrpSpPr/>
+        <p:nvPr/>
+      </p:nvGrpSpPr>
+      <p:grpSpPr>
+        <a:xfrm>
+          <a:off x="0" y="0"/>
+          <a:ext cx="0" cy="0"/>
+          <a:chOff x="0" y="0"/>
+          <a:chExt cx="0" cy="0"/>
+        </a:xfrm>
+      </p:grpSpPr>
+      <p:sp>
+        <p:nvSpPr>
+          <p:cNvPr id="2" name="Title 1"/>
+          <p:cNvSpPr>
+            <a:spLocks noGrp="1"/>
+          </p:cNvSpPr>
+          <p:nvPr>
+            <p:ph type="title"/>
+          </p:nvPr>
+        </p:nvSpPr>
+        <p:spPr/>
+        <p:txBody>
+          <a:bodyPr/>
+          <a:lstStyle/>
+          <a:p>
+            <a:pPr lvl="0" marL="0" indent="0">
+              <a:buNone/>
+            </a:pPr>
+            <a:r>
+              <a:rPr/>
+              <a:t>Spark</a:t>
+            </a:r>
+          </a:p>
+        </p:txBody>
+      </p:sp>
+      <p:pic>
+        <p:nvPicPr>
+          <p:cNvPr descr="../images/apache_spark.png" id="0" name="Picture 1"/>
+          <p:cNvPicPr>
+            <a:picLocks noGrp="1" noChangeAspect="1"/>
+          </p:cNvPicPr>
+          <p:nvPr/>
+        </p:nvPicPr>
+        <p:blipFill>
+          <a:blip r:embed="rId3"/>
+          <a:stretch>
+            <a:fillRect/>
+          </a:stretch>
+        </p:blipFill>
+        <p:spPr bwMode="auto">
+          <a:xfrm>
+            <a:off x="1574800" y="1600200"/>
+            <a:ext cx="5994400" cy="4013200"/>
+          </a:xfrm>
+          <a:prstGeom prst="rect">
+            <a:avLst/>
+          </a:prstGeom>
+          <a:noFill/>
+          <a:ln w="9525">
+            <a:noFill/>
+            <a:headEnd/>
+            <a:tailEnd/>
+          </a:ln>
+        </p:spPr>
+      </p:pic>
+      <p:sp>
+        <p:nvSpPr>
+          <p:cNvPr id="1" name="TextBox 3"/>
+          <p:cNvSpPr txBox="1"/>
+          <p:nvPr/>
+        </p:nvSpPr>
+        <p:spPr>
+          <a:xfrm>
+            <a:off x="457200" y="5613400"/>
+            <a:ext cx="8229600" cy="508000"/>
+          </a:xfrm>
+          <a:prstGeom prst="rect">
+            <a:avLst/>
+          </a:prstGeom>
+          <a:noFill/>
+        </p:spPr>
+        <p:txBody>
+          <a:bodyPr/>
+          <a:lstStyle/>
+          <a:p>
+            <a:pPr lvl="0" marL="0" indent="0" algn="ctr">
+              <a:buNone/>
+            </a:pPr>
+            <a:r>
+              <a:rPr/>
+              <a:t>Screenshot</a:t>
+            </a:r>
+            <a:r>
+              <a:rPr/>
+              <a:t> </a:t>
+            </a:r>
+            <a:r>
+              <a:rPr/>
+              <a:t>of</a:t>
+            </a:r>
+            <a:r>
+              <a:rPr/>
+              <a:t> </a:t>
+            </a:r>
+            <a:r>
+              <a:rPr/>
+              <a:t>Apache</a:t>
+            </a:r>
+            <a:r>
+              <a:rPr/>
+              <a:t> </a:t>
+            </a:r>
+            <a:r>
+              <a:rPr/>
+              <a:t>Spark</a:t>
+            </a:r>
+            <a:r>
+              <a:rPr/>
+              <a:t> </a:t>
+            </a:r>
+            <a:r>
+              <a:rPr/>
+              <a:t>main</a:t>
+            </a:r>
+            <a:r>
+              <a:rPr/>
+              <a:t> </a:t>
+            </a:r>
+            <a:r>
+              <a:rPr/>
+              <a:t>web</a:t>
+            </a:r>
+            <a:r>
+              <a:rPr/>
+              <a:t> </a:t>
+            </a:r>
+            <a:r>
+              <a:rPr/>
+              <a:t>page</a:t>
+            </a:r>
+          </a:p>
+        </p:txBody>
+      </p:sp>
+    </p:spTree>
+  </p:cSld>
+</p:sld>
+</file>
+
+<file path=ppt/slides/slide13.xml><?xml version="1.0" encoding="utf-8"?>
+<p:sld xmlns:a="http://schemas.openxmlformats.org/drawingml/2006/main" xmlns:r="http://schemas.openxmlformats.org/officeDocument/2006/relationships" xmlns:p="http://schemas.openxmlformats.org/presentationml/2006/main">
+  <p:cSld>
+    <p:spTree>
+      <p:nvGrpSpPr>
+        <p:cNvPr id="1" name=""/>
+        <p:cNvGrpSpPr/>
+        <p:nvPr/>
+      </p:nvGrpSpPr>
+      <p:grpSpPr>
+        <a:xfrm>
+          <a:off x="0" y="0"/>
+          <a:ext cx="0" cy="0"/>
+          <a:chOff x="0" y="0"/>
+          <a:chExt cx="0" cy="0"/>
+        </a:xfrm>
+      </p:grpSpPr>
+      <p:sp>
+        <p:nvSpPr>
+          <p:cNvPr id="2" name="Title 1"/>
+          <p:cNvSpPr>
+            <a:spLocks noGrp="1"/>
+          </p:cNvSpPr>
+          <p:nvPr>
+            <p:ph type="title"/>
+          </p:nvPr>
+        </p:nvSpPr>
+        <p:spPr/>
+        <p:txBody>
+          <a:bodyPr/>
+          <a:lstStyle/>
+          <a:p>
+            <a:pPr lvl="0" marL="0" indent="0">
+              <a:buNone/>
+            </a:pPr>
+            <a:r>
+              <a:rPr/>
+              <a:t>Conclusion</a:t>
+            </a:r>
+          </a:p>
+        </p:txBody>
+      </p:sp>
+      <p:sp>
+        <p:nvSpPr>
+          <p:cNvPr id="3" name="Content Placeholder 2"/>
+          <p:cNvSpPr>
+            <a:spLocks noGrp="1"/>
+          </p:cNvSpPr>
+          <p:nvPr>
+            <p:ph idx="1"/>
+          </p:nvPr>
+        </p:nvSpPr>
+        <p:spPr/>
+        <p:txBody>
+          <a:bodyPr/>
+          <a:lstStyle/>
+          <a:p>
+            <a:pPr lvl="0" marL="0" indent="0">
+              <a:buNone/>
+            </a:pPr>
+            <a:r>
+              <a:rPr/>
+              <a:t>This talk has covered</a:t>
+            </a:r>
+          </a:p>
+          <a:p>
+            <a:pPr lvl="1"/>
+            <a:r>
+              <a:rPr/>
+              <a:t>Message Passing Interface</a:t>
+            </a:r>
+          </a:p>
+          <a:p>
+            <a:pPr lvl="1"/>
+            <a:r>
+              <a:rPr/>
+              <a:t>Hadoop</a:t>
+            </a:r>
+          </a:p>
+          <a:p>
+            <a:pPr lvl="2"/>
+            <a:r>
+              <a:rPr/>
+              <a:t>MapReduce</a:t>
+            </a:r>
+          </a:p>
+          <a:p>
+            <a:pPr lvl="2"/>
+            <a:r>
+              <a:rPr/>
+              <a:t>HDFS</a:t>
+            </a:r>
+          </a:p>
+          <a:p>
+            <a:pPr lvl="2"/>
+            <a:r>
+              <a:rPr/>
+              <a:t>Pig</a:t>
+            </a:r>
+          </a:p>
+          <a:p>
+            <a:pPr lvl="2"/>
+            <a:r>
+              <a:rPr/>
+              <a:t>Hive</a:t>
+            </a:r>
+          </a:p>
+          <a:p>
+            <a:pPr lvl="1"/>
+            <a:r>
+              <a:rPr/>
+              <a:t>Spark</a:t>
+            </a:r>
+          </a:p>
+        </p:txBody>
+      </p:sp>
+    </p:spTree>
+  </p:cSld>
+</p:sld>
+</file>
+
 <file path=ppt/slides/slide2.xml><?xml version="1.0" encoding="utf-8"?>
 <p:sld xmlns:a="http://schemas.openxmlformats.org/drawingml/2006/main" xmlns:r="http://schemas.openxmlformats.org/officeDocument/2006/relationships" xmlns:p="http://schemas.openxmlformats.org/presentationml/2006/main">
   <p:cSld>
@@ -7309,7 +9302,31 @@
             </a:pPr>
             <a:r>
               <a:rPr/>
-              <a:t>Screenshot</a:t>
+              <a:t>Colm</a:t>
+            </a:r>
+            <a:r>
+              <a:rPr/>
+              <a:t> </a:t>
+            </a:r>
+            <a:r>
+              <a:rPr/>
+              <a:t>Ó</a:t>
+            </a:r>
+            <a:r>
+              <a:rPr/>
+              <a:t> </a:t>
+            </a:r>
+            <a:r>
+              <a:rPr/>
+              <a:t>hÉigeartaigh;’s</a:t>
+            </a:r>
+            <a:r>
+              <a:rPr/>
+              <a:t> </a:t>
+            </a:r>
+            <a:r>
+              <a:rPr/>
+              <a:t>website</a:t>
             </a:r>
             <a:r>
               <a:rPr/>
@@ -7548,6 +9565,50 @@
           </a:p>
         </p:txBody>
       </p:sp>
+      <p:sp>
+        <p:nvSpPr>
+          <p:cNvPr id="3" name="Content Placeholder 2"/>
+          <p:cNvSpPr>
+            <a:spLocks noGrp="1"/>
+          </p:cNvSpPr>
+          <p:nvPr>
+            <p:ph idx="1"/>
+          </p:nvPr>
+        </p:nvSpPr>
+        <p:spPr/>
+        <p:txBody>
+          <a:bodyPr/>
+          <a:lstStyle/>
+          <a:p>
+            <a:pPr lvl="1"/>
+            <a:r>
+              <a:rPr/>
+              <a:t>MapReduce</a:t>
+            </a:r>
+          </a:p>
+          <a:p>
+            <a:pPr lvl="1"/>
+            <a:r>
+              <a:rPr/>
+              <a:t>Hadoop Distributed File System (HDFS)</a:t>
+            </a:r>
+          </a:p>
+          <a:p>
+            <a:pPr lvl="1"/>
+            <a:r>
+              <a:rPr/>
+              <a:t>Hive</a:t>
+            </a:r>
+          </a:p>
+          <a:p>
+            <a:pPr lvl="1"/>
+            <a:r>
+              <a:rPr/>
+              <a:t>Pig</a:t>
+            </a:r>
+          </a:p>
+        </p:txBody>
+      </p:sp>
     </p:spTree>
   </p:cSld>
 </p:sld>
@@ -7590,46 +9651,286 @@
             </a:pPr>
             <a:r>
               <a:rPr/>
-              <a:t>Conclusion</a:t>
-            </a:r>
-          </a:p>
-        </p:txBody>
-      </p:sp>
-      <p:sp>
-        <p:nvSpPr>
-          <p:cNvPr id="3" name="Content Placeholder 2"/>
-          <p:cNvSpPr>
-            <a:spLocks noGrp="1"/>
-          </p:cNvSpPr>
-          <p:nvPr>
-            <p:ph idx="1"/>
-          </p:nvPr>
-        </p:nvSpPr>
-        <p:spPr/>
+              <a:t>MapReduce</a:t>
+            </a:r>
+          </a:p>
+        </p:txBody>
+      </p:sp>
+      <p:pic>
+        <p:nvPicPr>
+          <p:cNvPr descr="../images/mapreduce_illustration.png" id="0" name="Picture 1"/>
+          <p:cNvPicPr>
+            <a:picLocks noGrp="1" noChangeAspect="1"/>
+          </p:cNvPicPr>
+          <p:nvPr/>
+        </p:nvPicPr>
+        <p:blipFill>
+          <a:blip r:embed="rId3"/>
+          <a:stretch>
+            <a:fillRect/>
+          </a:stretch>
+        </p:blipFill>
+        <p:spPr bwMode="auto">
+          <a:xfrm>
+            <a:off x="457200" y="1701800"/>
+            <a:ext cx="8229600" cy="3822700"/>
+          </a:xfrm>
+          <a:prstGeom prst="rect">
+            <a:avLst/>
+          </a:prstGeom>
+          <a:noFill/>
+          <a:ln w="9525">
+            <a:noFill/>
+            <a:headEnd/>
+            <a:tailEnd/>
+          </a:ln>
+        </p:spPr>
+      </p:pic>
+      <p:sp>
+        <p:nvSpPr>
+          <p:cNvPr id="1" name="TextBox 3"/>
+          <p:cNvSpPr txBox="1"/>
+          <p:nvPr/>
+        </p:nvSpPr>
+        <p:spPr>
+          <a:xfrm>
+            <a:off x="457200" y="5613400"/>
+            <a:ext cx="8229600" cy="508000"/>
+          </a:xfrm>
+          <a:prstGeom prst="rect">
+            <a:avLst/>
+          </a:prstGeom>
+          <a:noFill/>
+        </p:spPr>
         <p:txBody>
           <a:bodyPr/>
           <a:lstStyle/>
           <a:p>
+            <a:pPr lvl="0" marL="0" indent="0" algn="ctr">
+              <a:buNone/>
+            </a:pPr>
+            <a:r>
+              <a:rPr/>
+              <a:t>Mapreduce</a:t>
+            </a:r>
+            <a:r>
+              <a:rPr/>
+              <a:t> </a:t>
+            </a:r>
+            <a:r>
+              <a:rPr/>
+              <a:t>applied</a:t>
+            </a:r>
+            <a:r>
+              <a:rPr/>
+              <a:t> </a:t>
+            </a:r>
+            <a:r>
+              <a:rPr/>
+              <a:t>to</a:t>
+            </a:r>
+            <a:r>
+              <a:rPr/>
+              <a:t> </a:t>
+            </a:r>
+            <a:r>
+              <a:rPr/>
+              <a:t>a</a:t>
+            </a:r>
+            <a:r>
+              <a:rPr/>
+              <a:t> </a:t>
+            </a:r>
+            <a:r>
+              <a:rPr/>
+              <a:t>simple</a:t>
+            </a:r>
+            <a:r>
+              <a:rPr/>
+              <a:t> </a:t>
+            </a:r>
+            <a:r>
+              <a:rPr/>
+              <a:t>word</a:t>
+            </a:r>
+            <a:r>
+              <a:rPr/>
+              <a:t> </a:t>
+            </a:r>
+            <a:r>
+              <a:rPr/>
+              <a:t>count</a:t>
+            </a:r>
+            <a:r>
+              <a:rPr/>
+              <a:t> </a:t>
+            </a:r>
+            <a:r>
+              <a:rPr/>
+              <a:t>example</a:t>
+            </a:r>
+          </a:p>
+        </p:txBody>
+      </p:sp>
+    </p:spTree>
+  </p:cSld>
+</p:sld>
+</file>
+
+<file path=ppt/slides/slide9.xml><?xml version="1.0" encoding="utf-8"?>
+<p:sld xmlns:a="http://schemas.openxmlformats.org/drawingml/2006/main" xmlns:r="http://schemas.openxmlformats.org/officeDocument/2006/relationships" xmlns:p="http://schemas.openxmlformats.org/presentationml/2006/main">
+  <p:cSld>
+    <p:spTree>
+      <p:nvGrpSpPr>
+        <p:cNvPr id="1" name=""/>
+        <p:cNvGrpSpPr/>
+        <p:nvPr/>
+      </p:nvGrpSpPr>
+      <p:grpSpPr>
+        <a:xfrm>
+          <a:off x="0" y="0"/>
+          <a:ext cx="0" cy="0"/>
+          <a:chOff x="0" y="0"/>
+          <a:chExt cx="0" cy="0"/>
+        </a:xfrm>
+      </p:grpSpPr>
+      <p:sp>
+        <p:nvSpPr>
+          <p:cNvPr id="2" name="Title 1"/>
+          <p:cNvSpPr>
+            <a:spLocks noGrp="1"/>
+          </p:cNvSpPr>
+          <p:nvPr>
+            <p:ph type="title"/>
+          </p:nvPr>
+        </p:nvSpPr>
+        <p:spPr/>
+        <p:txBody>
+          <a:bodyPr/>
+          <a:lstStyle/>
+          <a:p>
             <a:pPr lvl="0" marL="0" indent="0">
               <a:buNone/>
             </a:pPr>
             <a:r>
               <a:rPr/>
-              <a:t>This talk has covered</a:t>
-            </a:r>
-          </a:p>
-          <a:p>
-            <a:pPr lvl="1"/>
-            <a:r>
-              <a:rPr/>
-              <a:t>Message Passing Interface</a:t>
-            </a:r>
-          </a:p>
-          <a:p>
-            <a:pPr lvl="1"/>
-            <a:r>
-              <a:rPr/>
-              <a:t>…</a:t>
+              <a:t>Hadoop</a:t>
+            </a:r>
+            <a:r>
+              <a:rPr/>
+              <a:t> </a:t>
+            </a:r>
+            <a:r>
+              <a:rPr/>
+              <a:t>Distributed</a:t>
+            </a:r>
+            <a:r>
+              <a:rPr/>
+              <a:t> </a:t>
+            </a:r>
+            <a:r>
+              <a:rPr/>
+              <a:t>File</a:t>
+            </a:r>
+            <a:r>
+              <a:rPr/>
+              <a:t> </a:t>
+            </a:r>
+            <a:r>
+              <a:rPr/>
+              <a:t>System</a:t>
+            </a:r>
+            <a:r>
+              <a:rPr/>
+              <a:t> </a:t>
+            </a:r>
+            <a:r>
+              <a:rPr/>
+              <a:t>(HDFS)</a:t>
+            </a:r>
+          </a:p>
+        </p:txBody>
+      </p:sp>
+      <p:pic>
+        <p:nvPicPr>
+          <p:cNvPr descr="../images/hdfs_architecture.png" id="0" name="Picture 1"/>
+          <p:cNvPicPr>
+            <a:picLocks noGrp="1" noChangeAspect="1"/>
+          </p:cNvPicPr>
+          <p:nvPr/>
+        </p:nvPicPr>
+        <p:blipFill>
+          <a:blip r:embed="rId3"/>
+          <a:stretch>
+            <a:fillRect/>
+          </a:stretch>
+        </p:blipFill>
+        <p:spPr bwMode="auto">
+          <a:xfrm>
+            <a:off x="1574800" y="1600200"/>
+            <a:ext cx="5994400" cy="4013200"/>
+          </a:xfrm>
+          <a:prstGeom prst="rect">
+            <a:avLst/>
+          </a:prstGeom>
+          <a:noFill/>
+          <a:ln w="9525">
+            <a:noFill/>
+            <a:headEnd/>
+            <a:tailEnd/>
+          </a:ln>
+        </p:spPr>
+      </p:pic>
+      <p:sp>
+        <p:nvSpPr>
+          <p:cNvPr id="1" name="TextBox 3"/>
+          <p:cNvSpPr txBox="1"/>
+          <p:nvPr/>
+        </p:nvSpPr>
+        <p:spPr>
+          <a:xfrm>
+            <a:off x="457200" y="5613400"/>
+            <a:ext cx="8229600" cy="508000"/>
+          </a:xfrm>
+          <a:prstGeom prst="rect">
+            <a:avLst/>
+          </a:prstGeom>
+          <a:noFill/>
+        </p:spPr>
+        <p:txBody>
+          <a:bodyPr/>
+          <a:lstStyle/>
+          <a:p>
+            <a:pPr lvl="0" marL="0" indent="0" algn="ctr">
+              <a:buNone/>
+            </a:pPr>
+            <a:r>
+              <a:rPr/>
+              <a:t>Illustration</a:t>
+            </a:r>
+            <a:r>
+              <a:rPr/>
+              <a:t> </a:t>
+            </a:r>
+            <a:r>
+              <a:rPr/>
+              <a:t>of</a:t>
+            </a:r>
+            <a:r>
+              <a:rPr/>
+              <a:t> </a:t>
+            </a:r>
+            <a:r>
+              <a:rPr/>
+              <a:t>HDFS</a:t>
+            </a:r>
+            <a:r>
+              <a:rPr/>
+              <a:t> </a:t>
+            </a:r>
+            <a:r>
+              <a:rPr/>
+              <a:t>architecture</a:t>
             </a:r>
           </a:p>
         </p:txBody>

</xml_diff>